<commit_message>
Updated LH coupling results
</commit_message>
<xml_diff>
--- a/Test Configurations/LHCD/LHCD_Config_and_results.pptx
+++ b/Test Configurations/LHCD/LHCD_Config_and_results.pptx
@@ -16,6 +16,7 @@
     <p:sldId id="264" r:id="rId10"/>
     <p:sldId id="259" r:id="rId11"/>
     <p:sldId id="261" r:id="rId12"/>
+    <p:sldId id="267" r:id="rId13"/>
   </p:sldIdLst>
   <p:sldSz cx="9144000" cy="6858000" type="screen4x3"/>
   <p:notesSz cx="6858000" cy="9144000"/>
@@ -298,7 +299,7 @@
           <a:p>
             <a:fld id="{AA309A6D-C09C-4548-B29A-6CF363A7E532}" type="datetimeFigureOut">
               <a:rPr lang="fr-FR" smtClean="0"/>
-              <a:t>09/08/2018</a:t>
+              <a:t>10/08/2018</a:t>
             </a:fld>
             <a:endParaRPr lang="fr-BE"/>
           </a:p>
@@ -463,7 +464,7 @@
           <a:p>
             <a:fld id="{AA309A6D-C09C-4548-B29A-6CF363A7E532}" type="datetimeFigureOut">
               <a:rPr lang="fr-FR" smtClean="0"/>
-              <a:t>09/08/2018</a:t>
+              <a:t>10/08/2018</a:t>
             </a:fld>
             <a:endParaRPr lang="fr-BE"/>
           </a:p>
@@ -638,7 +639,7 @@
           <a:p>
             <a:fld id="{AA309A6D-C09C-4548-B29A-6CF363A7E532}" type="datetimeFigureOut">
               <a:rPr lang="fr-FR" smtClean="0"/>
-              <a:t>09/08/2018</a:t>
+              <a:t>10/08/2018</a:t>
             </a:fld>
             <a:endParaRPr lang="fr-BE"/>
           </a:p>
@@ -803,7 +804,7 @@
           <a:p>
             <a:fld id="{AA309A6D-C09C-4548-B29A-6CF363A7E532}" type="datetimeFigureOut">
               <a:rPr lang="fr-FR" smtClean="0"/>
-              <a:t>09/08/2018</a:t>
+              <a:t>10/08/2018</a:t>
             </a:fld>
             <a:endParaRPr lang="fr-BE"/>
           </a:p>
@@ -1044,7 +1045,7 @@
           <a:p>
             <a:fld id="{AA309A6D-C09C-4548-B29A-6CF363A7E532}" type="datetimeFigureOut">
               <a:rPr lang="fr-FR" smtClean="0"/>
-              <a:t>09/08/2018</a:t>
+              <a:t>10/08/2018</a:t>
             </a:fld>
             <a:endParaRPr lang="fr-BE"/>
           </a:p>
@@ -1327,7 +1328,7 @@
           <a:p>
             <a:fld id="{AA309A6D-C09C-4548-B29A-6CF363A7E532}" type="datetimeFigureOut">
               <a:rPr lang="fr-FR" smtClean="0"/>
-              <a:t>09/08/2018</a:t>
+              <a:t>10/08/2018</a:t>
             </a:fld>
             <a:endParaRPr lang="fr-BE"/>
           </a:p>
@@ -1744,7 +1745,7 @@
           <a:p>
             <a:fld id="{AA309A6D-C09C-4548-B29A-6CF363A7E532}" type="datetimeFigureOut">
               <a:rPr lang="fr-FR" smtClean="0"/>
-              <a:t>09/08/2018</a:t>
+              <a:t>10/08/2018</a:t>
             </a:fld>
             <a:endParaRPr lang="fr-BE"/>
           </a:p>
@@ -1857,7 +1858,7 @@
           <a:p>
             <a:fld id="{AA309A6D-C09C-4548-B29A-6CF363A7E532}" type="datetimeFigureOut">
               <a:rPr lang="fr-FR" smtClean="0"/>
-              <a:t>09/08/2018</a:t>
+              <a:t>10/08/2018</a:t>
             </a:fld>
             <a:endParaRPr lang="fr-BE"/>
           </a:p>
@@ -1947,7 +1948,7 @@
           <a:p>
             <a:fld id="{AA309A6D-C09C-4548-B29A-6CF363A7E532}" type="datetimeFigureOut">
               <a:rPr lang="fr-FR" smtClean="0"/>
-              <a:t>09/08/2018</a:t>
+              <a:t>10/08/2018</a:t>
             </a:fld>
             <a:endParaRPr lang="fr-BE"/>
           </a:p>
@@ -2219,7 +2220,7 @@
           <a:p>
             <a:fld id="{AA309A6D-C09C-4548-B29A-6CF363A7E532}" type="datetimeFigureOut">
               <a:rPr lang="fr-FR" smtClean="0"/>
-              <a:t>09/08/2018</a:t>
+              <a:t>10/08/2018</a:t>
             </a:fld>
             <a:endParaRPr lang="fr-BE"/>
           </a:p>
@@ -2467,7 +2468,7 @@
           <a:p>
             <a:fld id="{AA309A6D-C09C-4548-B29A-6CF363A7E532}" type="datetimeFigureOut">
               <a:rPr lang="fr-FR" smtClean="0"/>
-              <a:t>09/08/2018</a:t>
+              <a:t>10/08/2018</a:t>
             </a:fld>
             <a:endParaRPr lang="fr-BE"/>
           </a:p>
@@ -2675,7 +2676,7 @@
           <a:p>
             <a:fld id="{AA309A6D-C09C-4548-B29A-6CF363A7E532}" type="datetimeFigureOut">
               <a:rPr lang="fr-FR" smtClean="0"/>
-              <a:t>09/08/2018</a:t>
+              <a:t>10/08/2018</a:t>
             </a:fld>
             <a:endParaRPr lang="fr-BE"/>
           </a:p>
@@ -3594,6 +3595,179 @@
 </p:sld>
 </file>
 
+<file path=ppt/slides/slide12.xml><?xml version="1.0" encoding="utf-8"?>
+<p:sld xmlns:a="http://schemas.openxmlformats.org/drawingml/2006/main" xmlns:r="http://schemas.openxmlformats.org/officeDocument/2006/relationships" xmlns:p="http://schemas.openxmlformats.org/presentationml/2006/main">
+  <p:cSld>
+    <p:spTree>
+      <p:nvGrpSpPr>
+        <p:cNvPr id="1" name=""/>
+        <p:cNvGrpSpPr/>
+        <p:nvPr/>
+      </p:nvGrpSpPr>
+      <p:grpSpPr>
+        <a:xfrm>
+          <a:off x="0" y="0"/>
+          <a:ext cx="0" cy="0"/>
+          <a:chOff x="0" y="0"/>
+          <a:chExt cx="0" cy="0"/>
+        </a:xfrm>
+      </p:grpSpPr>
+      <p:grpSp>
+        <p:nvGrpSpPr>
+          <p:cNvPr id="5" name="Groupe 4"/>
+          <p:cNvGrpSpPr/>
+          <p:nvPr/>
+        </p:nvGrpSpPr>
+        <p:grpSpPr>
+          <a:xfrm>
+            <a:off x="-2844824" y="764704"/>
+            <a:ext cx="12733089" cy="5715716"/>
+            <a:chOff x="-3984625" y="-411163"/>
+            <a:chExt cx="17113250" cy="7681913"/>
+          </a:xfrm>
+        </p:grpSpPr>
+        <p:pic>
+          <p:nvPicPr>
+            <p:cNvPr id="2050" name="Picture 2"/>
+            <p:cNvPicPr>
+              <a:picLocks noChangeAspect="1" noChangeArrowheads="1"/>
+            </p:cNvPicPr>
+            <p:nvPr/>
+          </p:nvPicPr>
+          <p:blipFill>
+            <a:blip r:embed="rId2">
+              <a:extLst>
+                <a:ext uri="{28A0092B-C50C-407E-A947-70E740481C1C}">
+                  <a14:useLocalDpi xmlns:a14="http://schemas.microsoft.com/office/drawing/2010/main" val="0"/>
+                </a:ext>
+              </a:extLst>
+            </a:blip>
+            <a:srcRect/>
+            <a:stretch>
+              <a:fillRect/>
+            </a:stretch>
+          </p:blipFill>
+          <p:spPr bwMode="auto">
+            <a:xfrm>
+              <a:off x="-3984625" y="-411163"/>
+              <a:ext cx="17113250" cy="7681913"/>
+            </a:xfrm>
+            <a:prstGeom prst="rect">
+              <a:avLst/>
+            </a:prstGeom>
+            <a:noFill/>
+            <a:ln>
+              <a:noFill/>
+            </a:ln>
+            <a:effectLst/>
+            <a:extLst>
+              <a:ext uri="{909E8E84-426E-40DD-AFC4-6F175D3DCCD1}">
+                <a14:hiddenFill xmlns:a14="http://schemas.microsoft.com/office/drawing/2010/main">
+                  <a:solidFill>
+                    <a:schemeClr val="accent1"/>
+                  </a:solidFill>
+                </a14:hiddenFill>
+              </a:ext>
+              <a:ext uri="{91240B29-F687-4F45-9708-019B960494DF}">
+                <a14:hiddenLine xmlns:a14="http://schemas.microsoft.com/office/drawing/2010/main" w="9525">
+                  <a:solidFill>
+                    <a:schemeClr val="tx1"/>
+                  </a:solidFill>
+                  <a:miter lim="800000"/>
+                  <a:headEnd/>
+                  <a:tailEnd/>
+                </a14:hiddenLine>
+              </a:ext>
+              <a:ext uri="{AF507438-7753-43E0-B8FC-AC1667EBCBE1}">
+                <a14:hiddenEffects xmlns:a14="http://schemas.microsoft.com/office/drawing/2010/main">
+                  <a:effectLst>
+                    <a:outerShdw dist="35921" dir="2700000" algn="ctr" rotWithShape="0">
+                      <a:schemeClr val="bg2"/>
+                    </a:outerShdw>
+                  </a:effectLst>
+                </a14:hiddenEffects>
+              </a:ext>
+            </a:extLst>
+          </p:spPr>
+        </p:pic>
+        <p:pic>
+          <p:nvPicPr>
+            <p:cNvPr id="2051" name="Picture 3"/>
+            <p:cNvPicPr>
+              <a:picLocks noChangeAspect="1" noChangeArrowheads="1"/>
+            </p:cNvPicPr>
+            <p:nvPr/>
+          </p:nvPicPr>
+          <p:blipFill>
+            <a:blip r:embed="rId3">
+              <a:extLst>
+                <a:ext uri="{28A0092B-C50C-407E-A947-70E740481C1C}">
+                  <a14:useLocalDpi xmlns:a14="http://schemas.microsoft.com/office/drawing/2010/main" val="0"/>
+                </a:ext>
+              </a:extLst>
+            </a:blip>
+            <a:srcRect/>
+            <a:stretch>
+              <a:fillRect/>
+            </a:stretch>
+          </p:blipFill>
+          <p:spPr bwMode="auto">
+            <a:xfrm>
+              <a:off x="-1548680" y="-307355"/>
+              <a:ext cx="14516100" cy="4816475"/>
+            </a:xfrm>
+            <a:prstGeom prst="rect">
+              <a:avLst/>
+            </a:prstGeom>
+            <a:noFill/>
+            <a:ln>
+              <a:noFill/>
+            </a:ln>
+            <a:effectLst/>
+            <a:extLst>
+              <a:ext uri="{909E8E84-426E-40DD-AFC4-6F175D3DCCD1}">
+                <a14:hiddenFill xmlns:a14="http://schemas.microsoft.com/office/drawing/2010/main">
+                  <a:solidFill>
+                    <a:schemeClr val="accent1"/>
+                  </a:solidFill>
+                </a14:hiddenFill>
+              </a:ext>
+              <a:ext uri="{91240B29-F687-4F45-9708-019B960494DF}">
+                <a14:hiddenLine xmlns:a14="http://schemas.microsoft.com/office/drawing/2010/main" w="9525">
+                  <a:solidFill>
+                    <a:schemeClr val="tx1"/>
+                  </a:solidFill>
+                  <a:miter lim="800000"/>
+                  <a:headEnd/>
+                  <a:tailEnd/>
+                </a14:hiddenLine>
+              </a:ext>
+              <a:ext uri="{AF507438-7753-43E0-B8FC-AC1667EBCBE1}">
+                <a14:hiddenEffects xmlns:a14="http://schemas.microsoft.com/office/drawing/2010/main">
+                  <a:effectLst>
+                    <a:outerShdw dist="35921" dir="2700000" algn="ctr" rotWithShape="0">
+                      <a:schemeClr val="bg2"/>
+                    </a:outerShdw>
+                  </a:effectLst>
+                </a14:hiddenEffects>
+              </a:ext>
+            </a:extLst>
+          </p:spPr>
+        </p:pic>
+      </p:grpSp>
+    </p:spTree>
+    <p:extLst>
+      <p:ext uri="{BB962C8B-B14F-4D97-AF65-F5344CB8AC3E}">
+        <p14:creationId xmlns:p14="http://schemas.microsoft.com/office/powerpoint/2010/main" val="723388172"/>
+      </p:ext>
+    </p:extLst>
+  </p:cSld>
+  <p:clrMapOvr>
+    <a:masterClrMapping/>
+  </p:clrMapOvr>
+</p:sld>
+</file>
+
 <file path=ppt/slides/slide2.xml><?xml version="1.0" encoding="utf-8"?>
 <p:sld xmlns:a="http://schemas.openxmlformats.org/drawingml/2006/main" xmlns:r="http://schemas.openxmlformats.org/officeDocument/2006/relationships" xmlns:p="http://schemas.openxmlformats.org/presentationml/2006/main">
   <p:cSld>
@@ -3682,7 +3856,11 @@
             </a:pPr>
             <a:r>
               <a:rPr lang="pt-BR" dirty="0" smtClean="0"/>
-              <a:t>Losses in conductivity</a:t>
+              <a:t>Losses in </a:t>
+            </a:r>
+            <a:r>
+              <a:rPr lang="pt-BR" dirty="0" smtClean="0"/>
+              <a:t>conductivity:</a:t>
             </a:r>
           </a:p>
           <a:p>
@@ -3690,34 +3868,10 @@
               <a:buNone/>
             </a:pPr>
             <a:r>
-              <a:rPr lang="fr-FR" dirty="0"/>
-              <a:t>0.01*</a:t>
-            </a:r>
-            <a:r>
-              <a:rPr lang="fr-FR" dirty="0" err="1"/>
-              <a:t>exp</a:t>
-            </a:r>
-            <a:r>
-              <a:rPr lang="fr-FR" dirty="0"/>
-              <a:t>((X-$</a:t>
-            </a:r>
-            <a:r>
-              <a:rPr lang="fr-FR" dirty="0" err="1"/>
-              <a:t>dgap</a:t>
-            </a:r>
-            <a:r>
-              <a:rPr lang="fr-FR" dirty="0" smtClean="0"/>
-              <a:t>)/$</a:t>
-            </a:r>
-            <a:r>
-              <a:rPr lang="fr-FR" dirty="0" err="1" smtClean="0"/>
-              <a:t>loss</a:t>
-            </a:r>
-            <a:r>
-              <a:rPr lang="fr-FR" dirty="0" smtClean="0"/>
-              <a:t>-factor)</a:t>
-            </a:r>
-            <a:endParaRPr lang="fr-FR" dirty="0"/>
+              <a:rPr lang="pt-BR" dirty="0"/>
+              <a:t>if(X&gt;10e-3, $loss_factor*(X  - 10e-3)^2, 0) + if(Z&gt;180e-3,  $loss_factor*(Z - 180e-3)^2, 0) + if(Z&lt;40e-3,  $loss_factor*(-Z +40e-3)^2, 0)</a:t>
+            </a:r>
+            <a:endParaRPr lang="pt-BR" dirty="0" smtClean="0"/>
           </a:p>
         </p:txBody>
       </p:sp>
@@ -3753,7 +3907,7 @@
       </p:grpSpPr>
       <p:pic>
         <p:nvPicPr>
-          <p:cNvPr id="1026" name="Picture 2"/>
+          <p:cNvPr id="2" name="Picture 2"/>
           <p:cNvPicPr>
             <a:picLocks noChangeAspect="1" noChangeArrowheads="1"/>
           </p:cNvPicPr>
@@ -3774,62 +3928,8 @@
         </p:blipFill>
         <p:spPr bwMode="auto">
           <a:xfrm>
-            <a:off x="107504" y="271936"/>
-            <a:ext cx="5184576" cy="4968552"/>
-          </a:xfrm>
-          <a:prstGeom prst="rect">
-            <a:avLst/>
-          </a:prstGeom>
-          <a:noFill/>
-          <a:ln>
-            <a:noFill/>
-          </a:ln>
-          <a:extLst>
-            <a:ext uri="{909E8E84-426E-40DD-AFC4-6F175D3DCCD1}">
-              <a14:hiddenFill xmlns:a14="http://schemas.microsoft.com/office/drawing/2010/main">
-                <a:solidFill>
-                  <a:schemeClr val="accent1"/>
-                </a:solidFill>
-              </a14:hiddenFill>
-            </a:ext>
-            <a:ext uri="{91240B29-F687-4F45-9708-019B960494DF}">
-              <a14:hiddenLine xmlns:a14="http://schemas.microsoft.com/office/drawing/2010/main" w="9525">
-                <a:solidFill>
-                  <a:schemeClr val="tx1"/>
-                </a:solidFill>
-                <a:miter lim="800000"/>
-                <a:headEnd/>
-                <a:tailEnd/>
-              </a14:hiddenLine>
-            </a:ext>
-          </a:extLst>
-        </p:spPr>
-      </p:pic>
-      <p:pic>
-        <p:nvPicPr>
-          <p:cNvPr id="1027" name="Picture 3"/>
-          <p:cNvPicPr>
-            <a:picLocks noChangeAspect="1" noChangeArrowheads="1"/>
-          </p:cNvPicPr>
-          <p:nvPr/>
-        </p:nvPicPr>
-        <p:blipFill>
-          <a:blip r:embed="rId3">
-            <a:extLst>
-              <a:ext uri="{28A0092B-C50C-407E-A947-70E740481C1C}">
-                <a14:useLocalDpi xmlns:a14="http://schemas.microsoft.com/office/drawing/2010/main" val="0"/>
-              </a:ext>
-            </a:extLst>
-          </a:blip>
-          <a:srcRect/>
-          <a:stretch>
-            <a:fillRect/>
-          </a:stretch>
-        </p:blipFill>
-        <p:spPr bwMode="auto">
-          <a:xfrm>
-            <a:off x="5292080" y="404664"/>
-            <a:ext cx="6515100" cy="3213100"/>
+            <a:off x="14288" y="33338"/>
+            <a:ext cx="9115425" cy="6791325"/>
           </a:xfrm>
           <a:prstGeom prst="rect">
             <a:avLst/>

</xml_diff>

<commit_message>
Added more detail on the setup and how to plot the conductivity
</commit_message>
<xml_diff>
--- a/Test Configurations/LHCD/LHCD_Config_and_results.pptx
+++ b/Test Configurations/LHCD/LHCD_Config_and_results.pptx
@@ -6,17 +6,19 @@
   </p:sldMasterIdLst>
   <p:sldIdLst>
     <p:sldId id="256" r:id="rId2"/>
-    <p:sldId id="257" r:id="rId3"/>
-    <p:sldId id="265" r:id="rId4"/>
-    <p:sldId id="266" r:id="rId5"/>
-    <p:sldId id="258" r:id="rId6"/>
-    <p:sldId id="260" r:id="rId7"/>
-    <p:sldId id="262" r:id="rId8"/>
-    <p:sldId id="263" r:id="rId9"/>
-    <p:sldId id="264" r:id="rId10"/>
-    <p:sldId id="259" r:id="rId11"/>
-    <p:sldId id="261" r:id="rId12"/>
-    <p:sldId id="267" r:id="rId13"/>
+    <p:sldId id="268" r:id="rId3"/>
+    <p:sldId id="257" r:id="rId4"/>
+    <p:sldId id="265" r:id="rId5"/>
+    <p:sldId id="266" r:id="rId6"/>
+    <p:sldId id="258" r:id="rId7"/>
+    <p:sldId id="260" r:id="rId8"/>
+    <p:sldId id="262" r:id="rId9"/>
+    <p:sldId id="263" r:id="rId10"/>
+    <p:sldId id="264" r:id="rId11"/>
+    <p:sldId id="269" r:id="rId12"/>
+    <p:sldId id="259" r:id="rId13"/>
+    <p:sldId id="261" r:id="rId14"/>
+    <p:sldId id="267" r:id="rId15"/>
   </p:sldIdLst>
   <p:sldSz cx="9144000" cy="6858000" type="screen4x3"/>
   <p:notesSz cx="6858000" cy="9144000"/>
@@ -299,7 +301,7 @@
           <a:p>
             <a:fld id="{AA309A6D-C09C-4548-B29A-6CF363A7E532}" type="datetimeFigureOut">
               <a:rPr lang="fr-FR" smtClean="0"/>
-              <a:t>10/08/2018</a:t>
+              <a:t>22/05/2019</a:t>
             </a:fld>
             <a:endParaRPr lang="fr-BE"/>
           </a:p>
@@ -464,7 +466,7 @@
           <a:p>
             <a:fld id="{AA309A6D-C09C-4548-B29A-6CF363A7E532}" type="datetimeFigureOut">
               <a:rPr lang="fr-FR" smtClean="0"/>
-              <a:t>10/08/2018</a:t>
+              <a:t>22/05/2019</a:t>
             </a:fld>
             <a:endParaRPr lang="fr-BE"/>
           </a:p>
@@ -639,7 +641,7 @@
           <a:p>
             <a:fld id="{AA309A6D-C09C-4548-B29A-6CF363A7E532}" type="datetimeFigureOut">
               <a:rPr lang="fr-FR" smtClean="0"/>
-              <a:t>10/08/2018</a:t>
+              <a:t>22/05/2019</a:t>
             </a:fld>
             <a:endParaRPr lang="fr-BE"/>
           </a:p>
@@ -804,7 +806,7 @@
           <a:p>
             <a:fld id="{AA309A6D-C09C-4548-B29A-6CF363A7E532}" type="datetimeFigureOut">
               <a:rPr lang="fr-FR" smtClean="0"/>
-              <a:t>10/08/2018</a:t>
+              <a:t>22/05/2019</a:t>
             </a:fld>
             <a:endParaRPr lang="fr-BE"/>
           </a:p>
@@ -1045,7 +1047,7 @@
           <a:p>
             <a:fld id="{AA309A6D-C09C-4548-B29A-6CF363A7E532}" type="datetimeFigureOut">
               <a:rPr lang="fr-FR" smtClean="0"/>
-              <a:t>10/08/2018</a:t>
+              <a:t>22/05/2019</a:t>
             </a:fld>
             <a:endParaRPr lang="fr-BE"/>
           </a:p>
@@ -1328,7 +1330,7 @@
           <a:p>
             <a:fld id="{AA309A6D-C09C-4548-B29A-6CF363A7E532}" type="datetimeFigureOut">
               <a:rPr lang="fr-FR" smtClean="0"/>
-              <a:t>10/08/2018</a:t>
+              <a:t>22/05/2019</a:t>
             </a:fld>
             <a:endParaRPr lang="fr-BE"/>
           </a:p>
@@ -1745,7 +1747,7 @@
           <a:p>
             <a:fld id="{AA309A6D-C09C-4548-B29A-6CF363A7E532}" type="datetimeFigureOut">
               <a:rPr lang="fr-FR" smtClean="0"/>
-              <a:t>10/08/2018</a:t>
+              <a:t>22/05/2019</a:t>
             </a:fld>
             <a:endParaRPr lang="fr-BE"/>
           </a:p>
@@ -1858,7 +1860,7 @@
           <a:p>
             <a:fld id="{AA309A6D-C09C-4548-B29A-6CF363A7E532}" type="datetimeFigureOut">
               <a:rPr lang="fr-FR" smtClean="0"/>
-              <a:t>10/08/2018</a:t>
+              <a:t>22/05/2019</a:t>
             </a:fld>
             <a:endParaRPr lang="fr-BE"/>
           </a:p>
@@ -1948,7 +1950,7 @@
           <a:p>
             <a:fld id="{AA309A6D-C09C-4548-B29A-6CF363A7E532}" type="datetimeFigureOut">
               <a:rPr lang="fr-FR" smtClean="0"/>
-              <a:t>10/08/2018</a:t>
+              <a:t>22/05/2019</a:t>
             </a:fld>
             <a:endParaRPr lang="fr-BE"/>
           </a:p>
@@ -2220,7 +2222,7 @@
           <a:p>
             <a:fld id="{AA309A6D-C09C-4548-B29A-6CF363A7E532}" type="datetimeFigureOut">
               <a:rPr lang="fr-FR" smtClean="0"/>
-              <a:t>10/08/2018</a:t>
+              <a:t>22/05/2019</a:t>
             </a:fld>
             <a:endParaRPr lang="fr-BE"/>
           </a:p>
@@ -2468,7 +2470,7 @@
           <a:p>
             <a:fld id="{AA309A6D-C09C-4548-B29A-6CF363A7E532}" type="datetimeFigureOut">
               <a:rPr lang="fr-FR" smtClean="0"/>
-              <a:t>10/08/2018</a:t>
+              <a:t>22/05/2019</a:t>
             </a:fld>
             <a:endParaRPr lang="fr-BE"/>
           </a:p>
@@ -2676,7 +2678,7 @@
           <a:p>
             <a:fld id="{AA309A6D-C09C-4548-B29A-6CF363A7E532}" type="datetimeFigureOut">
               <a:rPr lang="fr-FR" smtClean="0"/>
-              <a:t>10/08/2018</a:t>
+              <a:t>22/05/2019</a:t>
             </a:fld>
             <a:endParaRPr lang="fr-BE"/>
           </a:p>
@@ -3046,9 +3048,116 @@
           <a:chExt cx="0" cy="0"/>
         </a:xfrm>
       </p:grpSpPr>
+      <p:sp>
+        <p:nvSpPr>
+          <p:cNvPr id="4" name="ZoneTexte 3"/>
+          <p:cNvSpPr txBox="1"/>
+          <p:nvPr/>
+        </p:nvSpPr>
+        <p:spPr>
+          <a:xfrm>
+            <a:off x="5004048" y="116632"/>
+            <a:ext cx="4049777" cy="2308324"/>
+          </a:xfrm>
+          <a:prstGeom prst="rect">
+            <a:avLst/>
+          </a:prstGeom>
+          <a:noFill/>
+        </p:spPr>
+        <p:txBody>
+          <a:bodyPr wrap="square" rtlCol="0">
+            <a:spAutoFit/>
+          </a:bodyPr>
+          <a:lstStyle/>
+          <a:p>
+            <a:r>
+              <a:rPr lang="fr-FR" u="sng" dirty="0" err="1" smtClean="0"/>
+              <a:t>Geometry</a:t>
+            </a:r>
+            <a:r>
+              <a:rPr lang="fr-FR" u="sng" dirty="0" smtClean="0"/>
+              <a:t>:</a:t>
+            </a:r>
+          </a:p>
+          <a:p>
+            <a:r>
+              <a:rPr lang="fr-FR" dirty="0" smtClean="0"/>
+              <a:t>6 </a:t>
+            </a:r>
+            <a:r>
+              <a:rPr lang="fr-FR" dirty="0" err="1" smtClean="0"/>
+              <a:t>waveguides</a:t>
+            </a:r>
+            <a:r>
+              <a:rPr lang="fr-FR" dirty="0" smtClean="0"/>
+              <a:t> 76x8.5mm</a:t>
+            </a:r>
+            <a:endParaRPr lang="fr-FR" dirty="0"/>
+          </a:p>
+          <a:p>
+            <a:r>
+              <a:rPr lang="fr-FR" dirty="0" smtClean="0"/>
+              <a:t>3.7 GHz</a:t>
+            </a:r>
+          </a:p>
+          <a:p>
+            <a:r>
+              <a:rPr lang="fr-FR" dirty="0" err="1" smtClean="0"/>
+              <a:t>d_gap</a:t>
+            </a:r>
+            <a:r>
+              <a:rPr lang="fr-FR" dirty="0" smtClean="0"/>
+              <a:t> vacuum (2 mm, </a:t>
+            </a:r>
+            <a:r>
+              <a:rPr lang="fr-FR" dirty="0" err="1" smtClean="0"/>
+              <a:t>tunable</a:t>
+            </a:r>
+            <a:r>
+              <a:rPr lang="fr-FR" dirty="0" smtClean="0"/>
+              <a:t>)</a:t>
+            </a:r>
+          </a:p>
+          <a:p>
+            <a:endParaRPr lang="fr-FR" dirty="0" smtClean="0"/>
+          </a:p>
+          <a:p>
+            <a:r>
+              <a:rPr lang="fr-FR" u="sng" dirty="0" smtClean="0"/>
+              <a:t>Plasma:</a:t>
+            </a:r>
+          </a:p>
+          <a:p>
+            <a:r>
+              <a:rPr lang="fr-FR" dirty="0" smtClean="0"/>
+              <a:t>Ne</a:t>
+            </a:r>
+            <a:r>
+              <a:rPr lang="fr-FR" baseline="-25000" dirty="0" smtClean="0"/>
+              <a:t>0</a:t>
+            </a:r>
+            <a:r>
+              <a:rPr lang="fr-FR" dirty="0" smtClean="0"/>
+              <a:t>=N x Ne</a:t>
+            </a:r>
+            <a:r>
+              <a:rPr lang="fr-FR" baseline="-25000" dirty="0" smtClean="0"/>
+              <a:t>c</a:t>
+            </a:r>
+            <a:endParaRPr lang="fr-FR" dirty="0" smtClean="0"/>
+          </a:p>
+          <a:p>
+            <a:r>
+              <a:rPr lang="fr-FR" dirty="0" smtClean="0"/>
+              <a:t>1 gradient de lambda</a:t>
+            </a:r>
+            <a:endParaRPr lang="fr-FR" dirty="0"/>
+          </a:p>
+        </p:txBody>
+      </p:sp>
       <p:pic>
         <p:nvPicPr>
-          <p:cNvPr id="1026" name="Picture 2"/>
+          <p:cNvPr id="2" name="Picture 2"/>
           <p:cNvPicPr>
             <a:picLocks noChangeAspect="1" noChangeArrowheads="1"/>
           </p:cNvPicPr>
@@ -3062,13 +3171,13 @@
               </a:ext>
             </a:extLst>
           </a:blip>
-          <a:srcRect r="37182" b="3674"/>
+          <a:srcRect l="20412" r="39821" b="5096"/>
           <a:stretch/>
         </p:blipFill>
         <p:spPr bwMode="auto">
           <a:xfrm>
-            <a:off x="251520" y="692696"/>
-            <a:ext cx="4196347" cy="3443709"/>
+            <a:off x="0" y="188640"/>
+            <a:ext cx="3391382" cy="3712258"/>
           </a:xfrm>
           <a:prstGeom prst="rect">
             <a:avLst/>
@@ -3100,7 +3209,7 @@
       </p:pic>
       <p:pic>
         <p:nvPicPr>
-          <p:cNvPr id="1027" name="Picture 3"/>
+          <p:cNvPr id="3" name="Picture 3"/>
           <p:cNvPicPr>
             <a:picLocks noChangeAspect="1" noChangeArrowheads="1"/>
           </p:cNvPicPr>
@@ -3114,13 +3223,13 @@
               </a:ext>
             </a:extLst>
           </a:blip>
-          <a:srcRect r="23386" b="12239"/>
+          <a:srcRect l="29641" r="28013" b="24330"/>
           <a:stretch/>
         </p:blipFill>
         <p:spPr bwMode="auto">
           <a:xfrm>
-            <a:off x="3779912" y="3789040"/>
-            <a:ext cx="5117962" cy="3137520"/>
+            <a:off x="4641448" y="3429000"/>
+            <a:ext cx="3611302" cy="2959904"/>
           </a:xfrm>
           <a:prstGeom prst="rect">
             <a:avLst/>
@@ -3150,82 +3259,6 @@
           </a:extLst>
         </p:spPr>
       </p:pic>
-      <p:sp>
-        <p:nvSpPr>
-          <p:cNvPr id="4" name="ZoneTexte 3"/>
-          <p:cNvSpPr txBox="1"/>
-          <p:nvPr/>
-        </p:nvSpPr>
-        <p:spPr>
-          <a:xfrm>
-            <a:off x="5940152" y="692696"/>
-            <a:ext cx="2181559" cy="1477328"/>
-          </a:xfrm>
-          <a:prstGeom prst="rect">
-            <a:avLst/>
-          </a:prstGeom>
-          <a:noFill/>
-        </p:spPr>
-        <p:txBody>
-          <a:bodyPr wrap="none" rtlCol="0">
-            <a:spAutoFit/>
-          </a:bodyPr>
-          <a:lstStyle/>
-          <a:p>
-            <a:r>
-              <a:rPr lang="fr-FR" dirty="0" smtClean="0"/>
-              <a:t>6 </a:t>
-            </a:r>
-            <a:r>
-              <a:rPr lang="fr-FR" dirty="0" err="1" smtClean="0"/>
-              <a:t>waveguides</a:t>
-            </a:r>
-            <a:endParaRPr lang="fr-FR" dirty="0"/>
-          </a:p>
-          <a:p>
-            <a:r>
-              <a:rPr lang="fr-FR" dirty="0" smtClean="0"/>
-              <a:t>3.7 GHz</a:t>
-            </a:r>
-          </a:p>
-          <a:p>
-            <a:r>
-              <a:rPr lang="fr-FR" dirty="0" err="1" smtClean="0"/>
-              <a:t>d_gap</a:t>
-            </a:r>
-            <a:r>
-              <a:rPr lang="fr-FR" dirty="0" smtClean="0"/>
-              <a:t> vacuum</a:t>
-            </a:r>
-          </a:p>
-          <a:p>
-            <a:r>
-              <a:rPr lang="fr-FR" dirty="0" smtClean="0"/>
-              <a:t>Ne</a:t>
-            </a:r>
-            <a:r>
-              <a:rPr lang="fr-FR" baseline="-25000" dirty="0" smtClean="0"/>
-              <a:t>0</a:t>
-            </a:r>
-            <a:r>
-              <a:rPr lang="fr-FR" dirty="0" smtClean="0"/>
-              <a:t>=N x Ne</a:t>
-            </a:r>
-            <a:r>
-              <a:rPr lang="fr-FR" baseline="-25000" dirty="0" smtClean="0"/>
-              <a:t>c</a:t>
-            </a:r>
-            <a:endParaRPr lang="fr-FR" dirty="0" smtClean="0"/>
-          </a:p>
-          <a:p>
-            <a:r>
-              <a:rPr lang="fr-FR" dirty="0" smtClean="0"/>
-              <a:t>1 gradient de lambda</a:t>
-            </a:r>
-            <a:endParaRPr lang="fr-FR" dirty="0"/>
-          </a:p>
-        </p:txBody>
-      </p:sp>
     </p:spTree>
     <p:extLst>
       <p:ext uri="{BB962C8B-B14F-4D97-AF65-F5344CB8AC3E}">
@@ -3268,10 +3301,928 @@
         </p:nvSpPr>
         <p:spPr/>
         <p:txBody>
+          <a:bodyPr>
+            <a:normAutofit fontScale="90000"/>
+          </a:bodyPr>
+          <a:lstStyle/>
+          <a:p>
+            <a:r>
+              <a:rPr lang="fr-FR" dirty="0" smtClean="0"/>
+              <a:t>Log </a:t>
+            </a:r>
+            <a:r>
+              <a:rPr lang="fr-FR" dirty="0" err="1" smtClean="0"/>
+              <a:t>scale</a:t>
+            </a:r>
+            <a:r>
+              <a:rPr lang="fr-FR" dirty="0" smtClean="0"/>
+              <a:t/>
+            </a:r>
+            <a:br>
+              <a:rPr lang="fr-FR" dirty="0" smtClean="0"/>
+            </a:br>
+            <a:r>
+              <a:rPr lang="fr-FR" dirty="0" smtClean="0"/>
+              <a:t>3nc, Ln 1cm, 1mm gap</a:t>
+            </a:r>
+            <a:endParaRPr lang="fr-FR" dirty="0"/>
+          </a:p>
+        </p:txBody>
+      </p:sp>
+      <p:sp>
+        <p:nvSpPr>
+          <p:cNvPr id="3" name="Espace réservé du contenu 2"/>
+          <p:cNvSpPr>
+            <a:spLocks noGrp="1"/>
+          </p:cNvSpPr>
+          <p:nvPr>
+            <p:ph idx="1"/>
+          </p:nvPr>
+        </p:nvSpPr>
+        <p:spPr/>
+        <p:txBody>
           <a:bodyPr/>
           <a:lstStyle/>
           <a:p>
             <a:endParaRPr lang="fr-FR"/>
+          </a:p>
+        </p:txBody>
+      </p:sp>
+      <p:sp>
+        <p:nvSpPr>
+          <p:cNvPr id="5" name="ZoneTexte 4"/>
+          <p:cNvSpPr txBox="1"/>
+          <p:nvPr/>
+        </p:nvSpPr>
+        <p:spPr>
+          <a:xfrm>
+            <a:off x="7812360" y="548680"/>
+            <a:ext cx="939681" cy="369332"/>
+          </a:xfrm>
+          <a:prstGeom prst="rect">
+            <a:avLst/>
+          </a:prstGeom>
+          <a:noFill/>
+        </p:spPr>
+        <p:txBody>
+          <a:bodyPr wrap="none" rtlCol="0">
+            <a:spAutoFit/>
+          </a:bodyPr>
+          <a:lstStyle/>
+          <a:p>
+            <a:r>
+              <a:rPr lang="fr-FR" dirty="0" smtClean="0"/>
+              <a:t>340 000</a:t>
+            </a:r>
+            <a:endParaRPr lang="fr-FR" dirty="0"/>
+          </a:p>
+        </p:txBody>
+      </p:sp>
+      <p:pic>
+        <p:nvPicPr>
+          <p:cNvPr id="3074" name="Picture 2"/>
+          <p:cNvPicPr>
+            <a:picLocks noChangeAspect="1" noChangeArrowheads="1"/>
+          </p:cNvPicPr>
+          <p:nvPr/>
+        </p:nvPicPr>
+        <p:blipFill rotWithShape="1">
+          <a:blip r:embed="rId2">
+            <a:extLst>
+              <a:ext uri="{28A0092B-C50C-407E-A947-70E740481C1C}">
+                <a14:useLocalDpi xmlns:a14="http://schemas.microsoft.com/office/drawing/2010/main" val="0"/>
+              </a:ext>
+            </a:extLst>
+          </a:blip>
+          <a:srcRect b="54471"/>
+          <a:stretch/>
+        </p:blipFill>
+        <p:spPr bwMode="auto">
+          <a:xfrm>
+            <a:off x="1331640" y="1556792"/>
+            <a:ext cx="6667500" cy="2185649"/>
+          </a:xfrm>
+          <a:prstGeom prst="rect">
+            <a:avLst/>
+          </a:prstGeom>
+          <a:noFill/>
+          <a:ln>
+            <a:noFill/>
+          </a:ln>
+          <a:extLst>
+            <a:ext uri="{909E8E84-426E-40DD-AFC4-6F175D3DCCD1}">
+              <a14:hiddenFill xmlns:a14="http://schemas.microsoft.com/office/drawing/2010/main">
+                <a:solidFill>
+                  <a:schemeClr val="accent1"/>
+                </a:solidFill>
+              </a14:hiddenFill>
+            </a:ext>
+            <a:ext uri="{91240B29-F687-4F45-9708-019B960494DF}">
+              <a14:hiddenLine xmlns:a14="http://schemas.microsoft.com/office/drawing/2010/main" w="9525">
+                <a:solidFill>
+                  <a:schemeClr val="tx1"/>
+                </a:solidFill>
+                <a:miter lim="800000"/>
+                <a:headEnd/>
+                <a:tailEnd/>
+              </a14:hiddenLine>
+            </a:ext>
+          </a:extLst>
+        </p:spPr>
+      </p:pic>
+    </p:spTree>
+    <p:extLst>
+      <p:ext uri="{BB962C8B-B14F-4D97-AF65-F5344CB8AC3E}">
+        <p14:creationId xmlns:p14="http://schemas.microsoft.com/office/powerpoint/2010/main" val="2516193927"/>
+      </p:ext>
+    </p:extLst>
+  </p:cSld>
+  <p:clrMapOvr>
+    <a:masterClrMapping/>
+  </p:clrMapOvr>
+</p:sld>
+</file>
+
+<file path=ppt/slides/slide11.xml><?xml version="1.0" encoding="utf-8"?>
+<p:sld xmlns:a="http://schemas.openxmlformats.org/drawingml/2006/main" xmlns:r="http://schemas.openxmlformats.org/officeDocument/2006/relationships" xmlns:p="http://schemas.openxmlformats.org/presentationml/2006/main">
+  <p:cSld>
+    <p:spTree>
+      <p:nvGrpSpPr>
+        <p:cNvPr id="1" name=""/>
+        <p:cNvGrpSpPr/>
+        <p:nvPr/>
+      </p:nvGrpSpPr>
+      <p:grpSpPr>
+        <a:xfrm>
+          <a:off x="0" y="0"/>
+          <a:ext cx="0" cy="0"/>
+          <a:chOff x="0" y="0"/>
+          <a:chExt cx="0" cy="0"/>
+        </a:xfrm>
+      </p:grpSpPr>
+      <p:sp>
+        <p:nvSpPr>
+          <p:cNvPr id="2" name="Titre 1"/>
+          <p:cNvSpPr>
+            <a:spLocks noGrp="1"/>
+          </p:cNvSpPr>
+          <p:nvPr>
+            <p:ph type="title"/>
+          </p:nvPr>
+        </p:nvSpPr>
+        <p:spPr>
+          <a:xfrm>
+            <a:off x="457200" y="-26043"/>
+            <a:ext cx="8229600" cy="1143000"/>
+          </a:xfrm>
+        </p:spPr>
+        <p:txBody>
+          <a:bodyPr/>
+          <a:lstStyle/>
+          <a:p>
+            <a:r>
+              <a:rPr lang="fr-FR" dirty="0" err="1" smtClean="0"/>
+              <a:t>Plotting</a:t>
+            </a:r>
+            <a:r>
+              <a:rPr lang="fr-FR" dirty="0" smtClean="0"/>
+              <a:t> the </a:t>
+            </a:r>
+            <a:r>
+              <a:rPr lang="fr-FR" dirty="0" err="1" smtClean="0"/>
+              <a:t>conductivity</a:t>
+            </a:r>
+            <a:endParaRPr lang="en-GB" dirty="0"/>
+          </a:p>
+        </p:txBody>
+      </p:sp>
+      <p:sp>
+        <p:nvSpPr>
+          <p:cNvPr id="3" name="Espace réservé du contenu 2"/>
+          <p:cNvSpPr>
+            <a:spLocks noGrp="1"/>
+          </p:cNvSpPr>
+          <p:nvPr>
+            <p:ph idx="1"/>
+          </p:nvPr>
+        </p:nvSpPr>
+        <p:spPr>
+          <a:xfrm>
+            <a:off x="457200" y="872330"/>
+            <a:ext cx="8229600" cy="4525963"/>
+          </a:xfrm>
+        </p:spPr>
+        <p:txBody>
+          <a:bodyPr>
+            <a:normAutofit fontScale="70000" lnSpcReduction="20000"/>
+          </a:bodyPr>
+          <a:lstStyle/>
+          <a:p>
+            <a:pPr marL="0" lvl="0" indent="0" fontAlgn="base">
+              <a:spcBef>
+                <a:spcPct val="0"/>
+              </a:spcBef>
+              <a:spcAft>
+                <a:spcPct val="0"/>
+              </a:spcAft>
+              <a:buNone/>
+            </a:pPr>
+            <a:r>
+              <a:rPr lang="en-GB" altLang="en-US" dirty="0">
+                <a:solidFill>
+                  <a:srgbClr val="1F497D"/>
+                </a:solidFill>
+                <a:latin typeface="Arial" panose="020B0604020202020204" pitchFamily="34" charset="0"/>
+                <a:ea typeface="Calibri" pitchFamily="34" charset="0"/>
+                <a:cs typeface="Arial" panose="020B0604020202020204" pitchFamily="34" charset="0"/>
+              </a:rPr>
+              <a:t>The conductivity in HFSS (</a:t>
+            </a:r>
+            <a:r>
+              <a:rPr lang="en-GB" altLang="en-US" dirty="0" err="1">
+                <a:solidFill>
+                  <a:srgbClr val="1F497D"/>
+                </a:solidFill>
+                <a:latin typeface="Arial" panose="020B0604020202020204" pitchFamily="34" charset="0"/>
+                <a:ea typeface="Calibri" pitchFamily="34" charset="0"/>
+                <a:cs typeface="Arial" panose="020B0604020202020204" pitchFamily="34" charset="0"/>
+              </a:rPr>
+              <a:t>cond</a:t>
+            </a:r>
+            <a:r>
+              <a:rPr lang="en-GB" altLang="en-US" dirty="0">
+                <a:solidFill>
+                  <a:srgbClr val="1F497D"/>
+                </a:solidFill>
+                <a:latin typeface="Arial" panose="020B0604020202020204" pitchFamily="34" charset="0"/>
+                <a:ea typeface="Calibri" pitchFamily="34" charset="0"/>
+                <a:cs typeface="Arial" panose="020B0604020202020204" pitchFamily="34" charset="0"/>
+              </a:rPr>
+              <a:t>) can be found in the calculator as a tensor :</a:t>
+            </a:r>
+            <a:endParaRPr lang="en-GB" altLang="en-US" sz="800" dirty="0">
+              <a:latin typeface="Arial" pitchFamily="34" charset="0"/>
+              <a:cs typeface="Arial" pitchFamily="34" charset="0"/>
+            </a:endParaRPr>
+          </a:p>
+          <a:p>
+            <a:pPr marL="0" lvl="0" indent="0" fontAlgn="base">
+              <a:spcBef>
+                <a:spcPct val="0"/>
+              </a:spcBef>
+              <a:spcAft>
+                <a:spcPct val="0"/>
+              </a:spcAft>
+              <a:buNone/>
+            </a:pPr>
+            <a:endParaRPr lang="fr-FR" altLang="en-US" dirty="0" smtClean="0">
+              <a:solidFill>
+                <a:srgbClr val="1F497D"/>
+              </a:solidFill>
+              <a:latin typeface="Arial" panose="020B0604020202020204" pitchFamily="34" charset="0"/>
+              <a:ea typeface="Calibri" pitchFamily="34" charset="0"/>
+              <a:cs typeface="Arial" panose="020B0604020202020204" pitchFamily="34" charset="0"/>
+            </a:endParaRPr>
+          </a:p>
+          <a:p>
+            <a:pPr marL="0" lvl="0" indent="0" fontAlgn="base">
+              <a:spcBef>
+                <a:spcPct val="0"/>
+              </a:spcBef>
+              <a:spcAft>
+                <a:spcPct val="0"/>
+              </a:spcAft>
+              <a:buNone/>
+            </a:pPr>
+            <a:endParaRPr lang="fr-FR" altLang="en-US" dirty="0">
+              <a:solidFill>
+                <a:srgbClr val="1F497D"/>
+              </a:solidFill>
+              <a:latin typeface="Arial" panose="020B0604020202020204" pitchFamily="34" charset="0"/>
+              <a:ea typeface="Calibri" pitchFamily="34" charset="0"/>
+              <a:cs typeface="Arial" panose="020B0604020202020204" pitchFamily="34" charset="0"/>
+            </a:endParaRPr>
+          </a:p>
+          <a:p>
+            <a:pPr marL="0" lvl="0" indent="0" fontAlgn="base">
+              <a:spcBef>
+                <a:spcPct val="0"/>
+              </a:spcBef>
+              <a:spcAft>
+                <a:spcPct val="0"/>
+              </a:spcAft>
+              <a:buNone/>
+            </a:pPr>
+            <a:endParaRPr lang="fr-FR" altLang="en-US" dirty="0" smtClean="0">
+              <a:solidFill>
+                <a:srgbClr val="1F497D"/>
+              </a:solidFill>
+              <a:latin typeface="Arial" panose="020B0604020202020204" pitchFamily="34" charset="0"/>
+              <a:ea typeface="Calibri" pitchFamily="34" charset="0"/>
+              <a:cs typeface="Arial" panose="020B0604020202020204" pitchFamily="34" charset="0"/>
+            </a:endParaRPr>
+          </a:p>
+          <a:p>
+            <a:pPr marL="0" lvl="0" indent="0" fontAlgn="base">
+              <a:spcBef>
+                <a:spcPct val="0"/>
+              </a:spcBef>
+              <a:spcAft>
+                <a:spcPct val="0"/>
+              </a:spcAft>
+              <a:buNone/>
+            </a:pPr>
+            <a:endParaRPr lang="fr-FR" altLang="en-US" dirty="0">
+              <a:solidFill>
+                <a:srgbClr val="1F497D"/>
+              </a:solidFill>
+              <a:latin typeface="Arial" panose="020B0604020202020204" pitchFamily="34" charset="0"/>
+              <a:ea typeface="Calibri" pitchFamily="34" charset="0"/>
+              <a:cs typeface="Arial" panose="020B0604020202020204" pitchFamily="34" charset="0"/>
+            </a:endParaRPr>
+          </a:p>
+          <a:p>
+            <a:pPr marL="0" lvl="0" indent="0" fontAlgn="base">
+              <a:spcBef>
+                <a:spcPct val="0"/>
+              </a:spcBef>
+              <a:spcAft>
+                <a:spcPct val="0"/>
+              </a:spcAft>
+              <a:buNone/>
+            </a:pPr>
+            <a:endParaRPr lang="fr-FR" altLang="en-US" dirty="0" smtClean="0">
+              <a:solidFill>
+                <a:srgbClr val="1F497D"/>
+              </a:solidFill>
+              <a:latin typeface="Arial" panose="020B0604020202020204" pitchFamily="34" charset="0"/>
+              <a:ea typeface="Calibri" pitchFamily="34" charset="0"/>
+              <a:cs typeface="Arial" panose="020B0604020202020204" pitchFamily="34" charset="0"/>
+            </a:endParaRPr>
+          </a:p>
+          <a:p>
+            <a:pPr marL="0" lvl="0" indent="0" fontAlgn="base">
+              <a:spcBef>
+                <a:spcPct val="0"/>
+              </a:spcBef>
+              <a:spcAft>
+                <a:spcPct val="0"/>
+              </a:spcAft>
+              <a:buNone/>
+            </a:pPr>
+            <a:endParaRPr lang="fr-FR" altLang="en-US" dirty="0">
+              <a:solidFill>
+                <a:srgbClr val="1F497D"/>
+              </a:solidFill>
+              <a:latin typeface="Arial" panose="020B0604020202020204" pitchFamily="34" charset="0"/>
+              <a:ea typeface="Calibri" pitchFamily="34" charset="0"/>
+              <a:cs typeface="Arial" panose="020B0604020202020204" pitchFamily="34" charset="0"/>
+            </a:endParaRPr>
+          </a:p>
+          <a:p>
+            <a:pPr marL="0" lvl="0" indent="0" fontAlgn="base">
+              <a:spcBef>
+                <a:spcPct val="0"/>
+              </a:spcBef>
+              <a:spcAft>
+                <a:spcPct val="0"/>
+              </a:spcAft>
+              <a:buNone/>
+            </a:pPr>
+            <a:endParaRPr lang="fr-FR" altLang="en-US" dirty="0" smtClean="0">
+              <a:solidFill>
+                <a:srgbClr val="1F497D"/>
+              </a:solidFill>
+              <a:latin typeface="Arial" panose="020B0604020202020204" pitchFamily="34" charset="0"/>
+              <a:ea typeface="Calibri" pitchFamily="34" charset="0"/>
+              <a:cs typeface="Arial" panose="020B0604020202020204" pitchFamily="34" charset="0"/>
+            </a:endParaRPr>
+          </a:p>
+          <a:p>
+            <a:pPr marL="0" lvl="0" indent="0" fontAlgn="base">
+              <a:spcBef>
+                <a:spcPct val="0"/>
+              </a:spcBef>
+              <a:spcAft>
+                <a:spcPct val="0"/>
+              </a:spcAft>
+              <a:buNone/>
+            </a:pPr>
+            <a:endParaRPr lang="fr-FR" altLang="en-US" dirty="0">
+              <a:solidFill>
+                <a:srgbClr val="1F497D"/>
+              </a:solidFill>
+              <a:latin typeface="Arial" panose="020B0604020202020204" pitchFamily="34" charset="0"/>
+              <a:ea typeface="Calibri" pitchFamily="34" charset="0"/>
+              <a:cs typeface="Arial" panose="020B0604020202020204" pitchFamily="34" charset="0"/>
+            </a:endParaRPr>
+          </a:p>
+          <a:p>
+            <a:pPr marL="0" lvl="0" indent="0" fontAlgn="base">
+              <a:spcBef>
+                <a:spcPct val="0"/>
+              </a:spcBef>
+              <a:spcAft>
+                <a:spcPct val="0"/>
+              </a:spcAft>
+              <a:buNone/>
+            </a:pPr>
+            <a:endParaRPr lang="fr-FR" altLang="en-US" dirty="0" smtClean="0">
+              <a:solidFill>
+                <a:srgbClr val="1F497D"/>
+              </a:solidFill>
+              <a:latin typeface="Arial" panose="020B0604020202020204" pitchFamily="34" charset="0"/>
+              <a:ea typeface="Calibri" pitchFamily="34" charset="0"/>
+              <a:cs typeface="Arial" panose="020B0604020202020204" pitchFamily="34" charset="0"/>
+            </a:endParaRPr>
+          </a:p>
+          <a:p>
+            <a:pPr marL="0" lvl="0" indent="0" fontAlgn="base">
+              <a:spcBef>
+                <a:spcPct val="0"/>
+              </a:spcBef>
+              <a:spcAft>
+                <a:spcPct val="0"/>
+              </a:spcAft>
+              <a:buNone/>
+            </a:pPr>
+            <a:endParaRPr lang="en-GB" altLang="en-US" dirty="0" smtClean="0">
+              <a:solidFill>
+                <a:srgbClr val="1F497D"/>
+              </a:solidFill>
+              <a:latin typeface="Arial" panose="020B0604020202020204" pitchFamily="34" charset="0"/>
+              <a:ea typeface="Calibri" pitchFamily="34" charset="0"/>
+              <a:cs typeface="Arial" panose="020B0604020202020204" pitchFamily="34" charset="0"/>
+            </a:endParaRPr>
+          </a:p>
+          <a:p>
+            <a:r>
+              <a:rPr lang="en-GB" altLang="en-US" dirty="0" smtClean="0">
+                <a:solidFill>
+                  <a:srgbClr val="1F497D"/>
+                </a:solidFill>
+                <a:latin typeface="Arial" panose="020B0604020202020204" pitchFamily="34" charset="0"/>
+                <a:ea typeface="Calibri" pitchFamily="34" charset="0"/>
+                <a:cs typeface="Arial" panose="020B0604020202020204" pitchFamily="34" charset="0"/>
+              </a:rPr>
+              <a:t>But </a:t>
+            </a:r>
+            <a:r>
+              <a:rPr lang="en-GB" altLang="en-US" dirty="0">
+                <a:solidFill>
+                  <a:srgbClr val="1F497D"/>
+                </a:solidFill>
+                <a:latin typeface="Arial" panose="020B0604020202020204" pitchFamily="34" charset="0"/>
+                <a:ea typeface="Calibri" pitchFamily="34" charset="0"/>
+                <a:cs typeface="Arial" panose="020B0604020202020204" pitchFamily="34" charset="0"/>
+              </a:rPr>
+              <a:t>in order to plot the conductivity as field overlay, it must be defined as a </a:t>
+            </a:r>
+            <a:r>
+              <a:rPr lang="en-GB" altLang="en-US" dirty="0" smtClean="0">
+                <a:solidFill>
+                  <a:srgbClr val="1F497D"/>
+                </a:solidFill>
+                <a:latin typeface="Arial" panose="020B0604020202020204" pitchFamily="34" charset="0"/>
+                <a:ea typeface="Calibri" pitchFamily="34" charset="0"/>
+                <a:cs typeface="Arial" panose="020B0604020202020204" pitchFamily="34" charset="0"/>
+              </a:rPr>
+              <a:t>scalar (</a:t>
+            </a:r>
+            <a:r>
+              <a:rPr lang="en-GB" altLang="en-US" dirty="0" err="1" smtClean="0">
+                <a:solidFill>
+                  <a:srgbClr val="1F497D"/>
+                </a:solidFill>
+                <a:latin typeface="Arial" panose="020B0604020202020204" pitchFamily="34" charset="0"/>
+                <a:ea typeface="Calibri" pitchFamily="34" charset="0"/>
+                <a:cs typeface="Arial" panose="020B0604020202020204" pitchFamily="34" charset="0"/>
+              </a:rPr>
+              <a:t>Scl</a:t>
+            </a:r>
+            <a:r>
+              <a:rPr lang="en-GB" altLang="en-US" dirty="0" smtClean="0">
+                <a:solidFill>
+                  <a:srgbClr val="1F497D"/>
+                </a:solidFill>
+                <a:latin typeface="Arial" panose="020B0604020202020204" pitchFamily="34" charset="0"/>
+                <a:ea typeface="Calibri" pitchFamily="34" charset="0"/>
+                <a:cs typeface="Arial" panose="020B0604020202020204" pitchFamily="34" charset="0"/>
+              </a:rPr>
+              <a:t>). </a:t>
+            </a:r>
+            <a:r>
+              <a:rPr lang="en-GB" dirty="0" smtClean="0">
+                <a:latin typeface="Arial" panose="020B0604020202020204" pitchFamily="34" charset="0"/>
+                <a:cs typeface="Arial" panose="020B0604020202020204" pitchFamily="34" charset="0"/>
+              </a:rPr>
+              <a:t>So </a:t>
+            </a:r>
+            <a:r>
+              <a:rPr lang="en-GB" dirty="0">
+                <a:latin typeface="Arial" panose="020B0604020202020204" pitchFamily="34" charset="0"/>
+                <a:cs typeface="Arial" panose="020B0604020202020204" pitchFamily="34" charset="0"/>
+              </a:rPr>
+              <a:t>I’ve projected it on x first (Number-&gt;Vector-&gt;1,0,0, then </a:t>
+            </a:r>
+            <a:r>
+              <a:rPr lang="en-GB" dirty="0" err="1">
+                <a:latin typeface="Arial" panose="020B0604020202020204" pitchFamily="34" charset="0"/>
+                <a:cs typeface="Arial" panose="020B0604020202020204" pitchFamily="34" charset="0"/>
+              </a:rPr>
+              <a:t>Matl</a:t>
+            </a:r>
+            <a:r>
+              <a:rPr lang="en-GB" dirty="0">
+                <a:latin typeface="Arial" panose="020B0604020202020204" pitchFamily="34" charset="0"/>
+                <a:cs typeface="Arial" panose="020B0604020202020204" pitchFamily="34" charset="0"/>
+              </a:rPr>
+              <a:t>-&gt;</a:t>
+            </a:r>
+            <a:r>
+              <a:rPr lang="en-GB" dirty="0" smtClean="0">
+                <a:latin typeface="Arial" panose="020B0604020202020204" pitchFamily="34" charset="0"/>
+                <a:cs typeface="Arial" panose="020B0604020202020204" pitchFamily="34" charset="0"/>
+              </a:rPr>
+              <a:t>Conductivity, then Mag</a:t>
+            </a:r>
+            <a:endParaRPr lang="en-GB" dirty="0">
+              <a:latin typeface="Arial" panose="020B0604020202020204" pitchFamily="34" charset="0"/>
+              <a:cs typeface="Arial" panose="020B0604020202020204" pitchFamily="34" charset="0"/>
+            </a:endParaRPr>
+          </a:p>
+          <a:p>
+            <a:pPr marL="0" lvl="0" indent="0" eaLnBrk="0" fontAlgn="base" hangingPunct="0">
+              <a:spcBef>
+                <a:spcPct val="0"/>
+              </a:spcBef>
+              <a:spcAft>
+                <a:spcPct val="0"/>
+              </a:spcAft>
+              <a:buNone/>
+            </a:pPr>
+            <a:endParaRPr lang="en-GB" altLang="en-US" sz="4800" dirty="0">
+              <a:latin typeface="Arial" pitchFamily="34" charset="0"/>
+              <a:cs typeface="Arial" pitchFamily="34" charset="0"/>
+            </a:endParaRPr>
+          </a:p>
+          <a:p>
+            <a:endParaRPr lang="en-GB" dirty="0">
+              <a:latin typeface="Arial" panose="020B0604020202020204" pitchFamily="34" charset="0"/>
+              <a:cs typeface="Arial" panose="020B0604020202020204" pitchFamily="34" charset="0"/>
+            </a:endParaRPr>
+          </a:p>
+        </p:txBody>
+      </p:sp>
+      <p:pic>
+        <p:nvPicPr>
+          <p:cNvPr id="1027" name="Image 7"/>
+          <p:cNvPicPr>
+            <a:picLocks noChangeAspect="1" noChangeArrowheads="1"/>
+          </p:cNvPicPr>
+          <p:nvPr/>
+        </p:nvPicPr>
+        <p:blipFill>
+          <a:blip r:embed="rId2">
+            <a:extLst>
+              <a:ext uri="{28A0092B-C50C-407E-A947-70E740481C1C}">
+                <a14:useLocalDpi xmlns:a14="http://schemas.microsoft.com/office/drawing/2010/main" val="0"/>
+              </a:ext>
+            </a:extLst>
+          </a:blip>
+          <a:srcRect/>
+          <a:stretch>
+            <a:fillRect/>
+          </a:stretch>
+        </p:blipFill>
+        <p:spPr bwMode="auto">
+          <a:xfrm>
+            <a:off x="2555776" y="1196752"/>
+            <a:ext cx="2980814" cy="2645891"/>
+          </a:xfrm>
+          <a:prstGeom prst="rect">
+            <a:avLst/>
+          </a:prstGeom>
+          <a:noFill/>
+          <a:extLst>
+            <a:ext uri="{909E8E84-426E-40DD-AFC4-6F175D3DCCD1}">
+              <a14:hiddenFill xmlns:a14="http://schemas.microsoft.com/office/drawing/2010/main">
+                <a:solidFill>
+                  <a:srgbClr val="FFFFFF"/>
+                </a:solidFill>
+              </a14:hiddenFill>
+            </a:ext>
+          </a:extLst>
+        </p:spPr>
+      </p:pic>
+      <p:pic>
+        <p:nvPicPr>
+          <p:cNvPr id="1026" name="Image 5"/>
+          <p:cNvPicPr>
+            <a:picLocks noChangeAspect="1" noChangeArrowheads="1"/>
+          </p:cNvPicPr>
+          <p:nvPr/>
+        </p:nvPicPr>
+        <p:blipFill rotWithShape="1">
+          <a:blip r:embed="rId3">
+            <a:extLst>
+              <a:ext uri="{28A0092B-C50C-407E-A947-70E740481C1C}">
+                <a14:useLocalDpi xmlns:a14="http://schemas.microsoft.com/office/drawing/2010/main" val="0"/>
+              </a:ext>
+            </a:extLst>
+          </a:blip>
+          <a:srcRect b="32358"/>
+          <a:stretch/>
+        </p:blipFill>
+        <p:spPr bwMode="auto">
+          <a:xfrm>
+            <a:off x="186740" y="5373217"/>
+            <a:ext cx="3146425" cy="448850"/>
+          </a:xfrm>
+          <a:prstGeom prst="rect">
+            <a:avLst/>
+          </a:prstGeom>
+          <a:noFill/>
+          <a:extLst>
+            <a:ext uri="{909E8E84-426E-40DD-AFC4-6F175D3DCCD1}">
+              <a14:hiddenFill xmlns:a14="http://schemas.microsoft.com/office/drawing/2010/main">
+                <a:solidFill>
+                  <a:srgbClr val="FFFFFF"/>
+                </a:solidFill>
+              </a14:hiddenFill>
+            </a:ext>
+          </a:extLst>
+        </p:spPr>
+      </p:pic>
+      <p:pic>
+        <p:nvPicPr>
+          <p:cNvPr id="1025" name="Image 6"/>
+          <p:cNvPicPr>
+            <a:picLocks noChangeAspect="1" noChangeArrowheads="1"/>
+          </p:cNvPicPr>
+          <p:nvPr/>
+        </p:nvPicPr>
+        <p:blipFill>
+          <a:blip r:embed="rId4" cstate="print">
+            <a:extLst>
+              <a:ext uri="{28A0092B-C50C-407E-A947-70E740481C1C}">
+                <a14:useLocalDpi xmlns:a14="http://schemas.microsoft.com/office/drawing/2010/main" val="0"/>
+              </a:ext>
+            </a:extLst>
+          </a:blip>
+          <a:srcRect/>
+          <a:stretch>
+            <a:fillRect/>
+          </a:stretch>
+        </p:blipFill>
+        <p:spPr bwMode="auto">
+          <a:xfrm>
+            <a:off x="6156176" y="4971663"/>
+            <a:ext cx="2467906" cy="1700808"/>
+          </a:xfrm>
+          <a:prstGeom prst="rect">
+            <a:avLst/>
+          </a:prstGeom>
+          <a:noFill/>
+          <a:extLst>
+            <a:ext uri="{909E8E84-426E-40DD-AFC4-6F175D3DCCD1}">
+              <a14:hiddenFill xmlns:a14="http://schemas.microsoft.com/office/drawing/2010/main">
+                <a:solidFill>
+                  <a:srgbClr val="FFFFFF"/>
+                </a:solidFill>
+              </a14:hiddenFill>
+            </a:ext>
+          </a:extLst>
+        </p:spPr>
+      </p:pic>
+      <p:sp>
+        <p:nvSpPr>
+          <p:cNvPr id="6" name="Rectangle 6"/>
+          <p:cNvSpPr>
+            <a:spLocks noChangeArrowheads="1"/>
+          </p:cNvSpPr>
+          <p:nvPr/>
+        </p:nvSpPr>
+        <p:spPr bwMode="auto">
+          <a:xfrm>
+            <a:off x="0" y="4130675"/>
+            <a:ext cx="9144000" cy="0"/>
+          </a:xfrm>
+          <a:prstGeom prst="rect">
+            <a:avLst/>
+          </a:prstGeom>
+          <a:noFill/>
+          <a:ln>
+            <a:noFill/>
+          </a:ln>
+          <a:effectLst/>
+          <a:extLst>
+            <a:ext uri="{909E8E84-426E-40DD-AFC4-6F175D3DCCD1}">
+              <a14:hiddenFill xmlns:a14="http://schemas.microsoft.com/office/drawing/2010/main">
+                <a:solidFill>
+                  <a:schemeClr val="accent1"/>
+                </a:solidFill>
+              </a14:hiddenFill>
+            </a:ext>
+            <a:ext uri="{91240B29-F687-4F45-9708-019B960494DF}">
+              <a14:hiddenLine xmlns:a14="http://schemas.microsoft.com/office/drawing/2010/main" w="9525">
+                <a:solidFill>
+                  <a:schemeClr val="tx1"/>
+                </a:solidFill>
+                <a:miter lim="800000"/>
+                <a:headEnd/>
+                <a:tailEnd/>
+              </a14:hiddenLine>
+            </a:ext>
+            <a:ext uri="{AF507438-7753-43E0-B8FC-AC1667EBCBE1}">
+              <a14:hiddenEffects xmlns:a14="http://schemas.microsoft.com/office/drawing/2010/main">
+                <a:effectLst>
+                  <a:outerShdw dist="35921" dir="2700000" algn="ctr" rotWithShape="0">
+                    <a:schemeClr val="bg2"/>
+                  </a:outerShdw>
+                </a:effectLst>
+              </a14:hiddenEffects>
+            </a:ext>
+          </a:extLst>
+        </p:spPr>
+        <p:txBody>
+          <a:bodyPr vert="horz" wrap="none" lIns="91440" tIns="45720" rIns="91440" bIns="45720" numCol="1" anchor="ctr" anchorCtr="0" compatLnSpc="1">
+            <a:prstTxWarp prst="textNoShape">
+              <a:avLst/>
+            </a:prstTxWarp>
+            <a:spAutoFit/>
+          </a:bodyPr>
+          <a:lstStyle/>
+          <a:p>
+            <a:pPr marL="0" marR="0" lvl="0" indent="0" algn="l" defTabSz="914400" rtl="0" eaLnBrk="1" fontAlgn="base" latinLnBrk="0" hangingPunct="1">
+              <a:lnSpc>
+                <a:spcPct val="100000"/>
+              </a:lnSpc>
+              <a:spcBef>
+                <a:spcPct val="0"/>
+              </a:spcBef>
+              <a:spcAft>
+                <a:spcPct val="0"/>
+              </a:spcAft>
+              <a:buClrTx/>
+              <a:buSzTx/>
+              <a:buFontTx/>
+              <a:buNone/>
+              <a:tabLst/>
+            </a:pPr>
+            <a:endParaRPr kumimoji="0" lang="en-US" altLang="en-US" sz="1800" b="0" i="0" u="none" strike="noStrike" cap="none" normalizeH="0" baseline="0" smtClean="0">
+              <a:ln>
+                <a:noFill/>
+              </a:ln>
+              <a:solidFill>
+                <a:schemeClr val="tx1"/>
+              </a:solidFill>
+              <a:effectLst/>
+              <a:latin typeface="Arial" pitchFamily="34" charset="0"/>
+              <a:cs typeface="Arial" pitchFamily="34" charset="0"/>
+            </a:endParaRPr>
+          </a:p>
+        </p:txBody>
+      </p:sp>
+      <p:sp>
+        <p:nvSpPr>
+          <p:cNvPr id="7" name="Rectangle 7"/>
+          <p:cNvSpPr>
+            <a:spLocks noChangeArrowheads="1"/>
+          </p:cNvSpPr>
+          <p:nvPr/>
+        </p:nvSpPr>
+        <p:spPr bwMode="auto">
+          <a:xfrm>
+            <a:off x="0" y="8101013"/>
+            <a:ext cx="9144000" cy="0"/>
+          </a:xfrm>
+          <a:prstGeom prst="rect">
+            <a:avLst/>
+          </a:prstGeom>
+          <a:noFill/>
+          <a:ln>
+            <a:noFill/>
+          </a:ln>
+          <a:effectLst/>
+          <a:extLst>
+            <a:ext uri="{909E8E84-426E-40DD-AFC4-6F175D3DCCD1}">
+              <a14:hiddenFill xmlns:a14="http://schemas.microsoft.com/office/drawing/2010/main">
+                <a:solidFill>
+                  <a:schemeClr val="accent1"/>
+                </a:solidFill>
+              </a14:hiddenFill>
+            </a:ext>
+            <a:ext uri="{91240B29-F687-4F45-9708-019B960494DF}">
+              <a14:hiddenLine xmlns:a14="http://schemas.microsoft.com/office/drawing/2010/main" w="9525">
+                <a:solidFill>
+                  <a:schemeClr val="tx1"/>
+                </a:solidFill>
+                <a:miter lim="800000"/>
+                <a:headEnd/>
+                <a:tailEnd/>
+              </a14:hiddenLine>
+            </a:ext>
+            <a:ext uri="{AF507438-7753-43E0-B8FC-AC1667EBCBE1}">
+              <a14:hiddenEffects xmlns:a14="http://schemas.microsoft.com/office/drawing/2010/main">
+                <a:effectLst>
+                  <a:outerShdw dist="35921" dir="2700000" algn="ctr" rotWithShape="0">
+                    <a:schemeClr val="bg2"/>
+                  </a:outerShdw>
+                </a:effectLst>
+              </a14:hiddenEffects>
+            </a:ext>
+          </a:extLst>
+        </p:spPr>
+        <p:txBody>
+          <a:bodyPr vert="horz" wrap="none" lIns="91440" tIns="45720" rIns="91440" bIns="45720" numCol="1" anchor="ctr" anchorCtr="0" compatLnSpc="1">
+            <a:prstTxWarp prst="textNoShape">
+              <a:avLst/>
+            </a:prstTxWarp>
+            <a:spAutoFit/>
+          </a:bodyPr>
+          <a:lstStyle/>
+          <a:p>
+            <a:pPr marL="0" marR="0" lvl="0" indent="0" algn="l" defTabSz="914400" rtl="0" eaLnBrk="1" fontAlgn="base" latinLnBrk="0" hangingPunct="1">
+              <a:lnSpc>
+                <a:spcPct val="100000"/>
+              </a:lnSpc>
+              <a:spcBef>
+                <a:spcPct val="0"/>
+              </a:spcBef>
+              <a:spcAft>
+                <a:spcPct val="0"/>
+              </a:spcAft>
+              <a:buClrTx/>
+              <a:buSzTx/>
+              <a:buFontTx/>
+              <a:buNone/>
+              <a:tabLst/>
+            </a:pPr>
+            <a:endParaRPr kumimoji="0" lang="en-US" altLang="en-US" sz="1800" b="0" i="0" u="none" strike="noStrike" cap="none" normalizeH="0" baseline="0" smtClean="0">
+              <a:ln>
+                <a:noFill/>
+              </a:ln>
+              <a:solidFill>
+                <a:schemeClr val="tx1"/>
+              </a:solidFill>
+              <a:effectLst/>
+              <a:latin typeface="Arial" pitchFamily="34" charset="0"/>
+              <a:cs typeface="Arial" pitchFamily="34" charset="0"/>
+            </a:endParaRPr>
+          </a:p>
+        </p:txBody>
+      </p:sp>
+    </p:spTree>
+    <p:extLst>
+      <p:ext uri="{BB962C8B-B14F-4D97-AF65-F5344CB8AC3E}">
+        <p14:creationId xmlns:p14="http://schemas.microsoft.com/office/powerpoint/2010/main" val="1765132634"/>
+      </p:ext>
+    </p:extLst>
+  </p:cSld>
+  <p:clrMapOvr>
+    <a:masterClrMapping/>
+  </p:clrMapOvr>
+</p:sld>
+</file>
+
+<file path=ppt/slides/slide12.xml><?xml version="1.0" encoding="utf-8"?>
+<p:sld xmlns:a="http://schemas.openxmlformats.org/drawingml/2006/main" xmlns:r="http://schemas.openxmlformats.org/officeDocument/2006/relationships" xmlns:p="http://schemas.openxmlformats.org/presentationml/2006/main">
+  <p:cSld>
+    <p:spTree>
+      <p:nvGrpSpPr>
+        <p:cNvPr id="1" name=""/>
+        <p:cNvGrpSpPr/>
+        <p:nvPr/>
+      </p:nvGrpSpPr>
+      <p:grpSpPr>
+        <a:xfrm>
+          <a:off x="0" y="0"/>
+          <a:ext cx="0" cy="0"/>
+          <a:chOff x="0" y="0"/>
+          <a:chExt cx="0" cy="0"/>
+        </a:xfrm>
+      </p:grpSpPr>
+      <p:sp>
+        <p:nvSpPr>
+          <p:cNvPr id="2" name="Titre 1"/>
+          <p:cNvSpPr>
+            <a:spLocks noGrp="1"/>
+          </p:cNvSpPr>
+          <p:nvPr>
+            <p:ph type="title"/>
+          </p:nvPr>
+        </p:nvSpPr>
+        <p:spPr/>
+        <p:txBody>
+          <a:bodyPr/>
+          <a:lstStyle/>
+          <a:p>
+            <a:r>
+              <a:rPr lang="fr-FR" dirty="0" err="1" smtClean="0"/>
+              <a:t>conductivity</a:t>
+            </a:r>
+            <a:endParaRPr lang="fr-FR" dirty="0"/>
           </a:p>
         </p:txBody>
       </p:sp>
@@ -3461,7 +4412,7 @@
 </p:sld>
 </file>
 
-<file path=ppt/slides/slide11.xml><?xml version="1.0" encoding="utf-8"?>
+<file path=ppt/slides/slide13.xml><?xml version="1.0" encoding="utf-8"?>
 <p:sld xmlns:a="http://schemas.openxmlformats.org/drawingml/2006/main" xmlns:r="http://schemas.openxmlformats.org/officeDocument/2006/relationships" xmlns:p="http://schemas.openxmlformats.org/presentationml/2006/main">
   <p:cSld>
     <p:spTree>
@@ -3595,7 +4546,7 @@
 </p:sld>
 </file>
 
-<file path=ppt/slides/slide12.xml><?xml version="1.0" encoding="utf-8"?>
+<file path=ppt/slides/slide14.xml><?xml version="1.0" encoding="utf-8"?>
 <p:sld xmlns:a="http://schemas.openxmlformats.org/drawingml/2006/main" xmlns:r="http://schemas.openxmlformats.org/officeDocument/2006/relationships" xmlns:p="http://schemas.openxmlformats.org/presentationml/2006/main">
   <p:cSld>
     <p:spTree>
@@ -3800,6 +4751,183 @@
           <a:bodyPr/>
           <a:lstStyle/>
           <a:p>
+            <a:r>
+              <a:rPr lang="fr-FR" dirty="0" err="1" smtClean="0"/>
+              <a:t>Boundary</a:t>
+            </a:r>
+            <a:r>
+              <a:rPr lang="fr-FR" dirty="0" smtClean="0"/>
+              <a:t> Conditions</a:t>
+            </a:r>
+            <a:endParaRPr lang="en-GB" dirty="0"/>
+          </a:p>
+        </p:txBody>
+      </p:sp>
+      <p:sp>
+        <p:nvSpPr>
+          <p:cNvPr id="3" name="Espace réservé du contenu 2"/>
+          <p:cNvSpPr>
+            <a:spLocks noGrp="1"/>
+          </p:cNvSpPr>
+          <p:nvPr>
+            <p:ph idx="1"/>
+          </p:nvPr>
+        </p:nvSpPr>
+        <p:spPr/>
+        <p:txBody>
+          <a:bodyPr/>
+          <a:lstStyle/>
+          <a:p>
+            <a:r>
+              <a:rPr lang="fr-FR" dirty="0" smtClean="0"/>
+              <a:t>No </a:t>
+            </a:r>
+            <a:r>
+              <a:rPr lang="fr-FR" dirty="0" err="1" smtClean="0"/>
+              <a:t>boundary</a:t>
+            </a:r>
+            <a:r>
+              <a:rPr lang="fr-FR" dirty="0" smtClean="0"/>
+              <a:t> conditions (</a:t>
+            </a:r>
+            <a:r>
+              <a:rPr lang="fr-FR" dirty="0" err="1" smtClean="0"/>
+              <a:t>ie</a:t>
+            </a:r>
+            <a:r>
+              <a:rPr lang="fr-FR" dirty="0" smtClean="0"/>
+              <a:t>. PEC all </a:t>
+            </a:r>
+            <a:r>
+              <a:rPr lang="fr-FR" dirty="0" err="1" smtClean="0"/>
+              <a:t>around</a:t>
+            </a:r>
+            <a:r>
+              <a:rPr lang="fr-FR" dirty="0" smtClean="0"/>
+              <a:t>).</a:t>
+            </a:r>
+          </a:p>
+          <a:p>
+            <a:r>
+              <a:rPr lang="fr-FR" dirty="0" smtClean="0"/>
+              <a:t>This </a:t>
+            </a:r>
+            <a:r>
+              <a:rPr lang="fr-FR" dirty="0" err="1" smtClean="0"/>
+              <a:t>will</a:t>
+            </a:r>
+            <a:r>
+              <a:rPr lang="fr-FR" dirty="0" smtClean="0"/>
+              <a:t> </a:t>
+            </a:r>
+            <a:r>
+              <a:rPr lang="fr-FR" dirty="0" err="1" smtClean="0"/>
+              <a:t>work</a:t>
+            </a:r>
+            <a:r>
+              <a:rPr lang="fr-FR" dirty="0" smtClean="0"/>
+              <a:t> </a:t>
+            </a:r>
+            <a:r>
+              <a:rPr lang="fr-FR" dirty="0" err="1" smtClean="0"/>
+              <a:t>only</a:t>
+            </a:r>
+            <a:r>
+              <a:rPr lang="fr-FR" dirty="0" smtClean="0"/>
+              <a:t> if </a:t>
+            </a:r>
+            <a:r>
+              <a:rPr lang="fr-FR" dirty="0" err="1" smtClean="0"/>
+              <a:t>attenuation</a:t>
+            </a:r>
+            <a:r>
+              <a:rPr lang="fr-FR" dirty="0" smtClean="0"/>
+              <a:t> in the plasma medium </a:t>
+            </a:r>
+            <a:r>
+              <a:rPr lang="fr-FR" dirty="0" err="1" smtClean="0"/>
+              <a:t>is</a:t>
+            </a:r>
+            <a:r>
+              <a:rPr lang="fr-FR" dirty="0" smtClean="0"/>
+              <a:t> </a:t>
+            </a:r>
+            <a:r>
+              <a:rPr lang="fr-FR" dirty="0" err="1" smtClean="0"/>
+              <a:t>sufficient</a:t>
+            </a:r>
+            <a:r>
+              <a:rPr lang="fr-FR" dirty="0" smtClean="0"/>
+              <a:t> (no </a:t>
+            </a:r>
+            <a:r>
+              <a:rPr lang="fr-FR" dirty="0" err="1" smtClean="0"/>
+              <a:t>fields</a:t>
+            </a:r>
+            <a:r>
+              <a:rPr lang="fr-FR" dirty="0" smtClean="0"/>
+              <a:t> at </a:t>
+            </a:r>
+            <a:r>
+              <a:rPr lang="fr-FR" dirty="0" err="1" smtClean="0"/>
+              <a:t>boundaries</a:t>
+            </a:r>
+            <a:r>
+              <a:rPr lang="fr-FR" dirty="0" smtClean="0"/>
+              <a:t>)</a:t>
+            </a:r>
+            <a:endParaRPr lang="fr-FR" dirty="0"/>
+          </a:p>
+          <a:p>
+            <a:endParaRPr lang="en-GB" dirty="0"/>
+          </a:p>
+        </p:txBody>
+      </p:sp>
+    </p:spTree>
+    <p:extLst>
+      <p:ext uri="{BB962C8B-B14F-4D97-AF65-F5344CB8AC3E}">
+        <p14:creationId xmlns:p14="http://schemas.microsoft.com/office/powerpoint/2010/main" val="3177764757"/>
+      </p:ext>
+    </p:extLst>
+  </p:cSld>
+  <p:clrMapOvr>
+    <a:masterClrMapping/>
+  </p:clrMapOvr>
+</p:sld>
+</file>
+
+<file path=ppt/slides/slide3.xml><?xml version="1.0" encoding="utf-8"?>
+<p:sld xmlns:a="http://schemas.openxmlformats.org/drawingml/2006/main" xmlns:r="http://schemas.openxmlformats.org/officeDocument/2006/relationships" xmlns:p="http://schemas.openxmlformats.org/presentationml/2006/main">
+  <p:cSld>
+    <p:spTree>
+      <p:nvGrpSpPr>
+        <p:cNvPr id="1" name=""/>
+        <p:cNvGrpSpPr/>
+        <p:nvPr/>
+      </p:nvGrpSpPr>
+      <p:grpSpPr>
+        <a:xfrm>
+          <a:off x="0" y="0"/>
+          <a:ext cx="0" cy="0"/>
+          <a:chOff x="0" y="0"/>
+          <a:chExt cx="0" cy="0"/>
+        </a:xfrm>
+      </p:grpSpPr>
+      <p:sp>
+        <p:nvSpPr>
+          <p:cNvPr id="2" name="Titre 1"/>
+          <p:cNvSpPr>
+            <a:spLocks noGrp="1"/>
+          </p:cNvSpPr>
+          <p:nvPr>
+            <p:ph type="title"/>
+          </p:nvPr>
+        </p:nvSpPr>
+        <p:spPr/>
+        <p:txBody>
+          <a:bodyPr/>
+          <a:lstStyle/>
+          <a:p>
             <a:endParaRPr lang="fr-FR"/>
           </a:p>
         </p:txBody>
@@ -3856,11 +4984,7 @@
             </a:pPr>
             <a:r>
               <a:rPr lang="pt-BR" dirty="0" smtClean="0"/>
-              <a:t>Losses in </a:t>
-            </a:r>
-            <a:r>
-              <a:rPr lang="pt-BR" dirty="0" smtClean="0"/>
-              <a:t>conductivity:</a:t>
+              <a:t>Losses in conductivity:</a:t>
             </a:r>
           </a:p>
           <a:p>
@@ -3888,7 +5012,7 @@
 </p:sld>
 </file>
 
-<file path=ppt/slides/slide3.xml><?xml version="1.0" encoding="utf-8"?>
+<file path=ppt/slides/slide4.xml><?xml version="1.0" encoding="utf-8"?>
 <p:sld xmlns:a="http://schemas.openxmlformats.org/drawingml/2006/main" xmlns:r="http://schemas.openxmlformats.org/officeDocument/2006/relationships" xmlns:p="http://schemas.openxmlformats.org/presentationml/2006/main">
   <p:cSld>
     <p:spTree>
@@ -3972,7 +5096,7 @@
 </p:sld>
 </file>
 
-<file path=ppt/slides/slide4.xml><?xml version="1.0" encoding="utf-8"?>
+<file path=ppt/slides/slide5.xml><?xml version="1.0" encoding="utf-8"?>
 <p:sld xmlns:a="http://schemas.openxmlformats.org/drawingml/2006/main" xmlns:r="http://schemas.openxmlformats.org/officeDocument/2006/relationships" xmlns:p="http://schemas.openxmlformats.org/presentationml/2006/main">
   <p:cSld>
     <p:spTree>
@@ -4214,7 +5338,7 @@
 </p:sld>
 </file>
 
-<file path=ppt/slides/slide5.xml><?xml version="1.0" encoding="utf-8"?>
+<file path=ppt/slides/slide6.xml><?xml version="1.0" encoding="utf-8"?>
 <p:sld xmlns:a="http://schemas.openxmlformats.org/drawingml/2006/main" xmlns:r="http://schemas.openxmlformats.org/officeDocument/2006/relationships" xmlns:p="http://schemas.openxmlformats.org/presentationml/2006/main">
   <p:cSld>
     <p:spTree>
@@ -4298,7 +5422,7 @@
 </p:sld>
 </file>
 
-<file path=ppt/slides/slide6.xml><?xml version="1.0" encoding="utf-8"?>
+<file path=ppt/slides/slide7.xml><?xml version="1.0" encoding="utf-8"?>
 <p:sld xmlns:a="http://schemas.openxmlformats.org/drawingml/2006/main" xmlns:r="http://schemas.openxmlformats.org/officeDocument/2006/relationships" xmlns:p="http://schemas.openxmlformats.org/presentationml/2006/main">
   <p:cSld>
     <p:spTree>
@@ -4470,7 +5594,7 @@
 </p:sld>
 </file>
 
-<file path=ppt/slides/slide7.xml><?xml version="1.0" encoding="utf-8"?>
+<file path=ppt/slides/slide8.xml><?xml version="1.0" encoding="utf-8"?>
 <p:sld xmlns:a="http://schemas.openxmlformats.org/drawingml/2006/main" xmlns:r="http://schemas.openxmlformats.org/officeDocument/2006/relationships" xmlns:p="http://schemas.openxmlformats.org/presentationml/2006/main">
   <p:cSld>
     <p:spTree>
@@ -4643,7 +5767,7 @@
 </p:sld>
 </file>
 
-<file path=ppt/slides/slide8.xml><?xml version="1.0" encoding="utf-8"?>
+<file path=ppt/slides/slide9.xml><?xml version="1.0" encoding="utf-8"?>
 <p:sld xmlns:a="http://schemas.openxmlformats.org/drawingml/2006/main" xmlns:r="http://schemas.openxmlformats.org/officeDocument/2006/relationships" xmlns:p="http://schemas.openxmlformats.org/presentationml/2006/main">
   <p:cSld>
     <p:spTree>
@@ -4807,177 +5931,6 @@
     <p:extLst>
       <p:ext uri="{BB962C8B-B14F-4D97-AF65-F5344CB8AC3E}">
         <p14:creationId xmlns:p14="http://schemas.microsoft.com/office/powerpoint/2010/main" val="358193009"/>
-      </p:ext>
-    </p:extLst>
-  </p:cSld>
-  <p:clrMapOvr>
-    <a:masterClrMapping/>
-  </p:clrMapOvr>
-</p:sld>
-</file>
-
-<file path=ppt/slides/slide9.xml><?xml version="1.0" encoding="utf-8"?>
-<p:sld xmlns:a="http://schemas.openxmlformats.org/drawingml/2006/main" xmlns:r="http://schemas.openxmlformats.org/officeDocument/2006/relationships" xmlns:p="http://schemas.openxmlformats.org/presentationml/2006/main">
-  <p:cSld>
-    <p:spTree>
-      <p:nvGrpSpPr>
-        <p:cNvPr id="1" name=""/>
-        <p:cNvGrpSpPr/>
-        <p:nvPr/>
-      </p:nvGrpSpPr>
-      <p:grpSpPr>
-        <a:xfrm>
-          <a:off x="0" y="0"/>
-          <a:ext cx="0" cy="0"/>
-          <a:chOff x="0" y="0"/>
-          <a:chExt cx="0" cy="0"/>
-        </a:xfrm>
-      </p:grpSpPr>
-      <p:sp>
-        <p:nvSpPr>
-          <p:cNvPr id="2" name="Titre 1"/>
-          <p:cNvSpPr>
-            <a:spLocks noGrp="1"/>
-          </p:cNvSpPr>
-          <p:nvPr>
-            <p:ph type="title"/>
-          </p:nvPr>
-        </p:nvSpPr>
-        <p:spPr/>
-        <p:txBody>
-          <a:bodyPr>
-            <a:normAutofit fontScale="90000"/>
-          </a:bodyPr>
-          <a:lstStyle/>
-          <a:p>
-            <a:r>
-              <a:rPr lang="fr-FR" dirty="0" smtClean="0"/>
-              <a:t>Log </a:t>
-            </a:r>
-            <a:r>
-              <a:rPr lang="fr-FR" dirty="0" err="1" smtClean="0"/>
-              <a:t>scale</a:t>
-            </a:r>
-            <a:r>
-              <a:rPr lang="fr-FR" dirty="0" smtClean="0"/>
-              <a:t/>
-            </a:r>
-            <a:br>
-              <a:rPr lang="fr-FR" dirty="0" smtClean="0"/>
-            </a:br>
-            <a:r>
-              <a:rPr lang="fr-FR" dirty="0" smtClean="0"/>
-              <a:t>3nc, Ln 1cm, 1mm gap</a:t>
-            </a:r>
-            <a:endParaRPr lang="fr-FR" dirty="0"/>
-          </a:p>
-        </p:txBody>
-      </p:sp>
-      <p:sp>
-        <p:nvSpPr>
-          <p:cNvPr id="3" name="Espace réservé du contenu 2"/>
-          <p:cNvSpPr>
-            <a:spLocks noGrp="1"/>
-          </p:cNvSpPr>
-          <p:nvPr>
-            <p:ph idx="1"/>
-          </p:nvPr>
-        </p:nvSpPr>
-        <p:spPr/>
-        <p:txBody>
-          <a:bodyPr/>
-          <a:lstStyle/>
-          <a:p>
-            <a:endParaRPr lang="fr-FR"/>
-          </a:p>
-        </p:txBody>
-      </p:sp>
-      <p:sp>
-        <p:nvSpPr>
-          <p:cNvPr id="5" name="ZoneTexte 4"/>
-          <p:cNvSpPr txBox="1"/>
-          <p:nvPr/>
-        </p:nvSpPr>
-        <p:spPr>
-          <a:xfrm>
-            <a:off x="7812360" y="548680"/>
-            <a:ext cx="939681" cy="369332"/>
-          </a:xfrm>
-          <a:prstGeom prst="rect">
-            <a:avLst/>
-          </a:prstGeom>
-          <a:noFill/>
-        </p:spPr>
-        <p:txBody>
-          <a:bodyPr wrap="none" rtlCol="0">
-            <a:spAutoFit/>
-          </a:bodyPr>
-          <a:lstStyle/>
-          <a:p>
-            <a:r>
-              <a:rPr lang="fr-FR" dirty="0" smtClean="0"/>
-              <a:t>340 000</a:t>
-            </a:r>
-            <a:endParaRPr lang="fr-FR" dirty="0"/>
-          </a:p>
-        </p:txBody>
-      </p:sp>
-      <p:pic>
-        <p:nvPicPr>
-          <p:cNvPr id="3074" name="Picture 2"/>
-          <p:cNvPicPr>
-            <a:picLocks noChangeAspect="1" noChangeArrowheads="1"/>
-          </p:cNvPicPr>
-          <p:nvPr/>
-        </p:nvPicPr>
-        <p:blipFill rotWithShape="1">
-          <a:blip r:embed="rId2">
-            <a:extLst>
-              <a:ext uri="{28A0092B-C50C-407E-A947-70E740481C1C}">
-                <a14:useLocalDpi xmlns:a14="http://schemas.microsoft.com/office/drawing/2010/main" val="0"/>
-              </a:ext>
-            </a:extLst>
-          </a:blip>
-          <a:srcRect b="54471"/>
-          <a:stretch/>
-        </p:blipFill>
-        <p:spPr bwMode="auto">
-          <a:xfrm>
-            <a:off x="1331640" y="1556792"/>
-            <a:ext cx="6667500" cy="2185649"/>
-          </a:xfrm>
-          <a:prstGeom prst="rect">
-            <a:avLst/>
-          </a:prstGeom>
-          <a:noFill/>
-          <a:ln>
-            <a:noFill/>
-          </a:ln>
-          <a:extLst>
-            <a:ext uri="{909E8E84-426E-40DD-AFC4-6F175D3DCCD1}">
-              <a14:hiddenFill xmlns:a14="http://schemas.microsoft.com/office/drawing/2010/main">
-                <a:solidFill>
-                  <a:schemeClr val="accent1"/>
-                </a:solidFill>
-              </a14:hiddenFill>
-            </a:ext>
-            <a:ext uri="{91240B29-F687-4F45-9708-019B960494DF}">
-              <a14:hiddenLine xmlns:a14="http://schemas.microsoft.com/office/drawing/2010/main" w="9525">
-                <a:solidFill>
-                  <a:schemeClr val="tx1"/>
-                </a:solidFill>
-                <a:miter lim="800000"/>
-                <a:headEnd/>
-                <a:tailEnd/>
-              </a14:hiddenLine>
-            </a:ext>
-          </a:extLst>
-        </p:spPr>
-      </p:pic>
-    </p:spTree>
-    <p:extLst>
-      <p:ext uri="{BB962C8B-B14F-4D97-AF65-F5344CB8AC3E}">
-        <p14:creationId xmlns:p14="http://schemas.microsoft.com/office/powerpoint/2010/main" val="2516193927"/>
       </p:ext>
     </p:extLst>
   </p:cSld>

</xml_diff>